<commit_message>
commit java design pattern study guide
</commit_message>
<xml_diff>
--- a/JavaDesignPattern.pptx
+++ b/JavaDesignPattern.pptx
@@ -2,7 +2,7 @@
 <file path=ppt/presentation.xml><?xml version="1.0" encoding="utf-8"?>
 <p:presentation xmlns:a="http://schemas.openxmlformats.org/drawingml/2006/main" xmlns:r="http://schemas.openxmlformats.org/officeDocument/2006/relationships" xmlns:p="http://schemas.openxmlformats.org/presentationml/2006/main" saveSubsetFonts="1" autoCompressPictures="0">
   <p:sldMasterIdLst>
-    <p:sldMasterId id="2147483648" r:id="rId1"/>
+    <p:sldMasterId id="2147483692" r:id="rId1"/>
   </p:sldMasterIdLst>
   <p:sldIdLst>
     <p:sldId id="256" r:id="rId2"/>
@@ -112,6 +112,11 @@
       </a:defRPr>
     </a:lvl9pPr>
   </p:defaultTextStyle>
+  <p:extLst>
+    <p:ext uri="{EFAFB233-063F-42B5-8137-9DF3F51BA10A}">
+      <p15:sldGuideLst xmlns:p15="http://schemas.microsoft.com/office/powerpoint/2012/main"/>
+    </p:ext>
+  </p:extLst>
 </p:presentation>
 </file>
 
@@ -616,9 +621,9 @@
           <a:lstStyle/>
           <a:p>
             <a:fld id="{B61BEF0D-F0BB-DE4B-95CE-6DB70DBA9567}" type="datetimeFigureOut">
-              <a:rPr lang="en-US" dirty="0"/>
+              <a:rPr lang="en-US" smtClean="0"/>
               <a:pPr/>
-              <a:t>3/6/17</a:t>
+              <a:t>3/13/17</a:t>
             </a:fld>
             <a:endParaRPr lang="en-US" dirty="0"/>
           </a:p>
@@ -664,7 +669,7 @@
           <a:lstStyle/>
           <a:p>
             <a:fld id="{D57F1E4F-1CFF-5643-939E-217C01CDF565}" type="slidenum">
-              <a:rPr lang="en-US" dirty="0"/>
+              <a:rPr lang="en-US" smtClean="0"/>
               <a:pPr/>
               <a:t>‹#›</a:t>
             </a:fld>
@@ -673,6 +678,11 @@
         </p:txBody>
       </p:sp>
     </p:spTree>
+    <p:extLst>
+      <p:ext uri="{BB962C8B-B14F-4D97-AF65-F5344CB8AC3E}">
+        <p14:creationId xmlns:p14="http://schemas.microsoft.com/office/powerpoint/2010/main" val="1904823095"/>
+      </p:ext>
+    </p:extLst>
   </p:cSld>
   <p:clrMapOvr>
     <a:masterClrMapping/>
@@ -909,9 +919,9 @@
           <a:lstStyle/>
           <a:p>
             <a:fld id="{B61BEF0D-F0BB-DE4B-95CE-6DB70DBA9567}" type="datetimeFigureOut">
-              <a:rPr lang="en-US" dirty="0"/>
+              <a:rPr lang="en-US" smtClean="0"/>
               <a:pPr/>
-              <a:t>3/6/17</a:t>
+              <a:t>3/13/17</a:t>
             </a:fld>
             <a:endParaRPr lang="en-US" dirty="0"/>
           </a:p>
@@ -952,7 +962,7 @@
           <a:lstStyle/>
           <a:p>
             <a:fld id="{D57F1E4F-1CFF-5643-939E-217C01CDF565}" type="slidenum">
-              <a:rPr lang="en-US" dirty="0"/>
+              <a:rPr lang="en-US" smtClean="0"/>
               <a:pPr/>
               <a:t>‹#›</a:t>
             </a:fld>
@@ -961,6 +971,11 @@
         </p:txBody>
       </p:sp>
     </p:spTree>
+    <p:extLst>
+      <p:ext uri="{BB962C8B-B14F-4D97-AF65-F5344CB8AC3E}">
+        <p14:creationId xmlns:p14="http://schemas.microsoft.com/office/powerpoint/2010/main" val="403880831"/>
+      </p:ext>
+    </p:extLst>
   </p:cSld>
   <p:clrMapOvr>
     <a:masterClrMapping/>
@@ -1154,9 +1169,9 @@
           <a:lstStyle/>
           <a:p>
             <a:fld id="{B61BEF0D-F0BB-DE4B-95CE-6DB70DBA9567}" type="datetimeFigureOut">
-              <a:rPr lang="en-US" dirty="0"/>
+              <a:rPr lang="en-US" smtClean="0"/>
               <a:pPr/>
-              <a:t>3/6/17</a:t>
+              <a:t>3/13/17</a:t>
             </a:fld>
             <a:endParaRPr lang="en-US" dirty="0"/>
           </a:p>
@@ -1197,7 +1212,7 @@
           <a:lstStyle/>
           <a:p>
             <a:fld id="{D57F1E4F-1CFF-5643-939E-217C01CDF565}" type="slidenum">
-              <a:rPr lang="en-US" dirty="0"/>
+              <a:rPr lang="en-US" smtClean="0"/>
               <a:pPr/>
               <a:t>‹#›</a:t>
             </a:fld>
@@ -1206,6 +1221,11 @@
         </p:txBody>
       </p:sp>
     </p:spTree>
+    <p:extLst>
+      <p:ext uri="{BB962C8B-B14F-4D97-AF65-F5344CB8AC3E}">
+        <p14:creationId xmlns:p14="http://schemas.microsoft.com/office/powerpoint/2010/main" val="1976802097"/>
+      </p:ext>
+    </p:extLst>
   </p:cSld>
   <p:clrMapOvr>
     <a:masterClrMapping/>
@@ -1691,9 +1711,9 @@
           <a:lstStyle/>
           <a:p>
             <a:fld id="{B61BEF0D-F0BB-DE4B-95CE-6DB70DBA9567}" type="datetimeFigureOut">
-              <a:rPr lang="en-US" dirty="0"/>
+              <a:rPr lang="en-US" smtClean="0"/>
               <a:pPr/>
-              <a:t>3/6/17</a:t>
+              <a:t>3/13/17</a:t>
             </a:fld>
             <a:endParaRPr lang="en-US" dirty="0"/>
           </a:p>
@@ -1734,7 +1754,7 @@
           <a:lstStyle/>
           <a:p>
             <a:fld id="{D57F1E4F-1CFF-5643-939E-217C01CDF565}" type="slidenum">
-              <a:rPr lang="en-US" dirty="0"/>
+              <a:rPr lang="en-US" smtClean="0"/>
               <a:pPr/>
               <a:t>‹#›</a:t>
             </a:fld>
@@ -1743,6 +1763,11 @@
         </p:txBody>
       </p:sp>
     </p:spTree>
+    <p:extLst>
+      <p:ext uri="{BB962C8B-B14F-4D97-AF65-F5344CB8AC3E}">
+        <p14:creationId xmlns:p14="http://schemas.microsoft.com/office/powerpoint/2010/main" val="393341542"/>
+      </p:ext>
+    </p:extLst>
   </p:cSld>
   <p:clrMapOvr>
     <a:masterClrMapping/>
@@ -1936,9 +1961,9 @@
           <a:lstStyle/>
           <a:p>
             <a:fld id="{B61BEF0D-F0BB-DE4B-95CE-6DB70DBA9567}" type="datetimeFigureOut">
-              <a:rPr lang="en-US" dirty="0"/>
+              <a:rPr lang="en-US" smtClean="0"/>
               <a:pPr/>
-              <a:t>3/6/17</a:t>
+              <a:t>3/13/17</a:t>
             </a:fld>
             <a:endParaRPr lang="en-US" dirty="0"/>
           </a:p>
@@ -1979,7 +2004,7 @@
           <a:lstStyle/>
           <a:p>
             <a:fld id="{D57F1E4F-1CFF-5643-939E-217C01CDF565}" type="slidenum">
-              <a:rPr lang="en-US" dirty="0"/>
+              <a:rPr lang="en-US" smtClean="0"/>
               <a:pPr/>
               <a:t>‹#›</a:t>
             </a:fld>
@@ -1988,6 +2013,11 @@
         </p:txBody>
       </p:sp>
     </p:spTree>
+    <p:extLst>
+      <p:ext uri="{BB962C8B-B14F-4D97-AF65-F5344CB8AC3E}">
+        <p14:creationId xmlns:p14="http://schemas.microsoft.com/office/powerpoint/2010/main" val="936630928"/>
+      </p:ext>
+    </p:extLst>
   </p:cSld>
   <p:clrMapOvr>
     <a:masterClrMapping/>
@@ -2465,9 +2495,9 @@
           <a:lstStyle/>
           <a:p>
             <a:fld id="{B61BEF0D-F0BB-DE4B-95CE-6DB70DBA9567}" type="datetimeFigureOut">
-              <a:rPr lang="en-US" dirty="0"/>
+              <a:rPr lang="en-US" smtClean="0"/>
               <a:pPr/>
-              <a:t>3/6/17</a:t>
+              <a:t>3/13/17</a:t>
             </a:fld>
             <a:endParaRPr lang="en-US" dirty="0"/>
           </a:p>
@@ -2508,7 +2538,7 @@
           <a:lstStyle/>
           <a:p>
             <a:fld id="{D57F1E4F-1CFF-5643-939E-217C01CDF565}" type="slidenum">
-              <a:rPr lang="en-US" dirty="0"/>
+              <a:rPr lang="en-US" smtClean="0"/>
               <a:pPr/>
               <a:t>‹#›</a:t>
             </a:fld>
@@ -2517,6 +2547,11 @@
         </p:txBody>
       </p:sp>
     </p:spTree>
+    <p:extLst>
+      <p:ext uri="{BB962C8B-B14F-4D97-AF65-F5344CB8AC3E}">
+        <p14:creationId xmlns:p14="http://schemas.microsoft.com/office/powerpoint/2010/main" val="900874386"/>
+      </p:ext>
+    </p:extLst>
   </p:cSld>
   <p:clrMapOvr>
     <a:masterClrMapping/>
@@ -2759,9 +2794,9 @@
           <a:lstStyle/>
           <a:p>
             <a:fld id="{B61BEF0D-F0BB-DE4B-95CE-6DB70DBA9567}" type="datetimeFigureOut">
-              <a:rPr lang="en-US" dirty="0"/>
+              <a:rPr lang="en-US" smtClean="0"/>
               <a:pPr/>
-              <a:t>3/6/17</a:t>
+              <a:t>3/13/17</a:t>
             </a:fld>
             <a:endParaRPr lang="en-US" dirty="0"/>
           </a:p>
@@ -2802,7 +2837,7 @@
           <a:lstStyle/>
           <a:p>
             <a:fld id="{D57F1E4F-1CFF-5643-939E-217C01CDF565}" type="slidenum">
-              <a:rPr lang="en-US" dirty="0"/>
+              <a:rPr lang="en-US" smtClean="0"/>
               <a:pPr/>
               <a:t>‹#›</a:t>
             </a:fld>
@@ -2811,6 +2846,11 @@
         </p:txBody>
       </p:sp>
     </p:spTree>
+    <p:extLst>
+      <p:ext uri="{BB962C8B-B14F-4D97-AF65-F5344CB8AC3E}">
+        <p14:creationId xmlns:p14="http://schemas.microsoft.com/office/powerpoint/2010/main" val="1236094152"/>
+      </p:ext>
+    </p:extLst>
   </p:cSld>
   <p:clrMapOvr>
     <a:masterClrMapping/>
@@ -2930,9 +2970,9 @@
           <a:lstStyle/>
           <a:p>
             <a:fld id="{B61BEF0D-F0BB-DE4B-95CE-6DB70DBA9567}" type="datetimeFigureOut">
-              <a:rPr lang="en-US" dirty="0"/>
+              <a:rPr lang="en-US" smtClean="0"/>
               <a:pPr/>
-              <a:t>3/6/17</a:t>
+              <a:t>3/13/17</a:t>
             </a:fld>
             <a:endParaRPr lang="en-US" dirty="0"/>
           </a:p>
@@ -2973,7 +3013,7 @@
           <a:lstStyle/>
           <a:p>
             <a:fld id="{D57F1E4F-1CFF-5643-939E-217C01CDF565}" type="slidenum">
-              <a:rPr lang="en-US" dirty="0"/>
+              <a:rPr lang="en-US" smtClean="0"/>
               <a:pPr/>
               <a:t>‹#›</a:t>
             </a:fld>
@@ -2982,6 +3022,11 @@
         </p:txBody>
       </p:sp>
     </p:spTree>
+    <p:extLst>
+      <p:ext uri="{BB962C8B-B14F-4D97-AF65-F5344CB8AC3E}">
+        <p14:creationId xmlns:p14="http://schemas.microsoft.com/office/powerpoint/2010/main" val="277611586"/>
+      </p:ext>
+    </p:extLst>
   </p:cSld>
   <p:clrMapOvr>
     <a:masterClrMapping/>
@@ -3107,9 +3152,9 @@
           <a:lstStyle/>
           <a:p>
             <a:fld id="{B61BEF0D-F0BB-DE4B-95CE-6DB70DBA9567}" type="datetimeFigureOut">
-              <a:rPr lang="en-US" dirty="0"/>
+              <a:rPr lang="en-US" smtClean="0"/>
               <a:pPr/>
-              <a:t>3/6/17</a:t>
+              <a:t>3/13/17</a:t>
             </a:fld>
             <a:endParaRPr lang="en-US" dirty="0"/>
           </a:p>
@@ -3150,7 +3195,7 @@
           <a:lstStyle/>
           <a:p>
             <a:fld id="{D57F1E4F-1CFF-5643-939E-217C01CDF565}" type="slidenum">
-              <a:rPr lang="en-US" dirty="0"/>
+              <a:rPr lang="en-US" smtClean="0"/>
               <a:pPr/>
               <a:t>‹#›</a:t>
             </a:fld>
@@ -3159,6 +3204,11 @@
         </p:txBody>
       </p:sp>
     </p:spTree>
+    <p:extLst>
+      <p:ext uri="{BB962C8B-B14F-4D97-AF65-F5344CB8AC3E}">
+        <p14:creationId xmlns:p14="http://schemas.microsoft.com/office/powerpoint/2010/main" val="1483444618"/>
+      </p:ext>
+    </p:extLst>
   </p:cSld>
   <p:clrMapOvr>
     <a:masterClrMapping/>
@@ -3274,9 +3324,9 @@
           <a:lstStyle/>
           <a:p>
             <a:fld id="{B61BEF0D-F0BB-DE4B-95CE-6DB70DBA9567}" type="datetimeFigureOut">
-              <a:rPr lang="en-US" dirty="0"/>
+              <a:rPr lang="en-US" smtClean="0"/>
               <a:pPr/>
-              <a:t>3/6/17</a:t>
+              <a:t>3/13/17</a:t>
             </a:fld>
             <a:endParaRPr lang="en-US" dirty="0"/>
           </a:p>
@@ -3322,7 +3372,7 @@
           <a:lstStyle/>
           <a:p>
             <a:fld id="{D57F1E4F-1CFF-5643-939E-217C01CDF565}" type="slidenum">
-              <a:rPr lang="en-US" dirty="0"/>
+              <a:rPr lang="en-US" smtClean="0"/>
               <a:pPr/>
               <a:t>‹#›</a:t>
             </a:fld>
@@ -3331,6 +3381,11 @@
         </p:txBody>
       </p:sp>
     </p:spTree>
+    <p:extLst>
+      <p:ext uri="{BB962C8B-B14F-4D97-AF65-F5344CB8AC3E}">
+        <p14:creationId xmlns:p14="http://schemas.microsoft.com/office/powerpoint/2010/main" val="1823031836"/>
+      </p:ext>
+    </p:extLst>
   </p:cSld>
   <p:clrMapOvr>
     <a:masterClrMapping/>
@@ -3522,9 +3577,9 @@
           <a:lstStyle/>
           <a:p>
             <a:fld id="{B61BEF0D-F0BB-DE4B-95CE-6DB70DBA9567}" type="datetimeFigureOut">
-              <a:rPr lang="en-US" dirty="0"/>
+              <a:rPr lang="en-US" smtClean="0"/>
               <a:pPr/>
-              <a:t>3/6/17</a:t>
+              <a:t>3/13/17</a:t>
             </a:fld>
             <a:endParaRPr lang="en-US" dirty="0"/>
           </a:p>
@@ -3565,7 +3620,7 @@
           <a:lstStyle/>
           <a:p>
             <a:fld id="{D57F1E4F-1CFF-5643-939E-217C01CDF565}" type="slidenum">
-              <a:rPr lang="en-US" dirty="0"/>
+              <a:rPr lang="en-US" smtClean="0"/>
               <a:pPr/>
               <a:t>‹#›</a:t>
             </a:fld>
@@ -3574,6 +3629,11 @@
         </p:txBody>
       </p:sp>
     </p:spTree>
+    <p:extLst>
+      <p:ext uri="{BB962C8B-B14F-4D97-AF65-F5344CB8AC3E}">
+        <p14:creationId xmlns:p14="http://schemas.microsoft.com/office/powerpoint/2010/main" val="1546875903"/>
+      </p:ext>
+    </p:extLst>
   </p:cSld>
   <p:clrMapOvr>
     <a:masterClrMapping/>
@@ -3816,9 +3876,9 @@
           <a:lstStyle/>
           <a:p>
             <a:fld id="{B61BEF0D-F0BB-DE4B-95CE-6DB70DBA9567}" type="datetimeFigureOut">
-              <a:rPr lang="en-US" dirty="0"/>
+              <a:rPr lang="en-US" smtClean="0"/>
               <a:pPr/>
-              <a:t>3/6/17</a:t>
+              <a:t>3/13/17</a:t>
             </a:fld>
             <a:endParaRPr lang="en-US" dirty="0"/>
           </a:p>
@@ -3859,7 +3919,7 @@
           <a:lstStyle/>
           <a:p>
             <a:fld id="{D57F1E4F-1CFF-5643-939E-217C01CDF565}" type="slidenum">
-              <a:rPr lang="en-US" dirty="0"/>
+              <a:rPr lang="en-US" smtClean="0"/>
               <a:pPr/>
               <a:t>‹#›</a:t>
             </a:fld>
@@ -3868,6 +3928,11 @@
         </p:txBody>
       </p:sp>
     </p:spTree>
+    <p:extLst>
+      <p:ext uri="{BB962C8B-B14F-4D97-AF65-F5344CB8AC3E}">
+        <p14:creationId xmlns:p14="http://schemas.microsoft.com/office/powerpoint/2010/main" val="906271139"/>
+      </p:ext>
+    </p:extLst>
   </p:cSld>
   <p:clrMapOvr>
     <a:masterClrMapping/>
@@ -4255,9 +4320,9 @@
           <a:lstStyle/>
           <a:p>
             <a:fld id="{B61BEF0D-F0BB-DE4B-95CE-6DB70DBA9567}" type="datetimeFigureOut">
-              <a:rPr lang="en-US" dirty="0"/>
+              <a:rPr lang="en-US" smtClean="0"/>
               <a:pPr/>
-              <a:t>3/6/17</a:t>
+              <a:t>3/13/17</a:t>
             </a:fld>
             <a:endParaRPr lang="en-US" dirty="0"/>
           </a:p>
@@ -4298,7 +4363,7 @@
           <a:lstStyle/>
           <a:p>
             <a:fld id="{D57F1E4F-1CFF-5643-939E-217C01CDF565}" type="slidenum">
-              <a:rPr lang="en-US" dirty="0"/>
+              <a:rPr lang="en-US" smtClean="0"/>
               <a:pPr/>
               <a:t>‹#›</a:t>
             </a:fld>
@@ -4307,6 +4372,11 @@
         </p:txBody>
       </p:sp>
     </p:spTree>
+    <p:extLst>
+      <p:ext uri="{BB962C8B-B14F-4D97-AF65-F5344CB8AC3E}">
+        <p14:creationId xmlns:p14="http://schemas.microsoft.com/office/powerpoint/2010/main" val="1745008649"/>
+      </p:ext>
+    </p:extLst>
   </p:cSld>
   <p:clrMapOvr>
     <a:masterClrMapping/>
@@ -4370,9 +4440,9 @@
           <a:lstStyle/>
           <a:p>
             <a:fld id="{B61BEF0D-F0BB-DE4B-95CE-6DB70DBA9567}" type="datetimeFigureOut">
-              <a:rPr lang="en-US" dirty="0"/>
+              <a:rPr lang="en-US" smtClean="0"/>
               <a:pPr/>
-              <a:t>3/6/17</a:t>
+              <a:t>3/13/17</a:t>
             </a:fld>
             <a:endParaRPr lang="en-US" dirty="0"/>
           </a:p>
@@ -4413,7 +4483,7 @@
           <a:lstStyle/>
           <a:p>
             <a:fld id="{D57F1E4F-1CFF-5643-939E-217C01CDF565}" type="slidenum">
-              <a:rPr lang="en-US" dirty="0"/>
+              <a:rPr lang="en-US" smtClean="0"/>
               <a:pPr/>
               <a:t>‹#›</a:t>
             </a:fld>
@@ -4422,6 +4492,11 @@
         </p:txBody>
       </p:sp>
     </p:spTree>
+    <p:extLst>
+      <p:ext uri="{BB962C8B-B14F-4D97-AF65-F5344CB8AC3E}">
+        <p14:creationId xmlns:p14="http://schemas.microsoft.com/office/powerpoint/2010/main" val="176196664"/>
+      </p:ext>
+    </p:extLst>
   </p:cSld>
   <p:clrMapOvr>
     <a:masterClrMapping/>
@@ -4462,9 +4537,9 @@
           <a:lstStyle/>
           <a:p>
             <a:fld id="{B61BEF0D-F0BB-DE4B-95CE-6DB70DBA9567}" type="datetimeFigureOut">
-              <a:rPr lang="en-US" dirty="0"/>
+              <a:rPr lang="en-US" smtClean="0"/>
               <a:pPr/>
-              <a:t>3/6/17</a:t>
+              <a:t>3/13/17</a:t>
             </a:fld>
             <a:endParaRPr lang="en-US" dirty="0"/>
           </a:p>
@@ -4505,7 +4580,7 @@
           <a:lstStyle/>
           <a:p>
             <a:fld id="{D57F1E4F-1CFF-5643-939E-217C01CDF565}" type="slidenum">
-              <a:rPr lang="en-US" dirty="0"/>
+              <a:rPr lang="en-US" smtClean="0"/>
               <a:pPr/>
               <a:t>‹#›</a:t>
             </a:fld>
@@ -4514,6 +4589,11 @@
         </p:txBody>
       </p:sp>
     </p:spTree>
+    <p:extLst>
+      <p:ext uri="{BB962C8B-B14F-4D97-AF65-F5344CB8AC3E}">
+        <p14:creationId xmlns:p14="http://schemas.microsoft.com/office/powerpoint/2010/main" val="2104866282"/>
+      </p:ext>
+    </p:extLst>
   </p:cSld>
   <p:clrMapOvr>
     <a:masterClrMapping/>
@@ -4742,9 +4822,9 @@
           <a:lstStyle/>
           <a:p>
             <a:fld id="{B61BEF0D-F0BB-DE4B-95CE-6DB70DBA9567}" type="datetimeFigureOut">
-              <a:rPr lang="en-US" dirty="0"/>
+              <a:rPr lang="en-US" smtClean="0"/>
               <a:pPr/>
-              <a:t>3/6/17</a:t>
+              <a:t>3/13/17</a:t>
             </a:fld>
             <a:endParaRPr lang="en-US" dirty="0"/>
           </a:p>
@@ -4785,7 +4865,7 @@
           <a:lstStyle/>
           <a:p>
             <a:fld id="{D57F1E4F-1CFF-5643-939E-217C01CDF565}" type="slidenum">
-              <a:rPr lang="en-US" dirty="0"/>
+              <a:rPr lang="en-US" smtClean="0"/>
               <a:pPr/>
               <a:t>‹#›</a:t>
             </a:fld>
@@ -4794,6 +4874,11 @@
         </p:txBody>
       </p:sp>
     </p:spTree>
+    <p:extLst>
+      <p:ext uri="{BB962C8B-B14F-4D97-AF65-F5344CB8AC3E}">
+        <p14:creationId xmlns:p14="http://schemas.microsoft.com/office/powerpoint/2010/main" val="989484543"/>
+      </p:ext>
+    </p:extLst>
   </p:cSld>
   <p:clrMapOvr>
     <a:masterClrMapping/>
@@ -5030,9 +5115,9 @@
           <a:lstStyle/>
           <a:p>
             <a:fld id="{B61BEF0D-F0BB-DE4B-95CE-6DB70DBA9567}" type="datetimeFigureOut">
-              <a:rPr lang="en-US" dirty="0"/>
+              <a:rPr lang="en-US" smtClean="0"/>
               <a:pPr/>
-              <a:t>3/6/17</a:t>
+              <a:t>3/13/17</a:t>
             </a:fld>
             <a:endParaRPr lang="en-US" dirty="0"/>
           </a:p>
@@ -5073,7 +5158,7 @@
           <a:lstStyle/>
           <a:p>
             <a:fld id="{D57F1E4F-1CFF-5643-939E-217C01CDF565}" type="slidenum">
-              <a:rPr lang="en-US" dirty="0"/>
+              <a:rPr lang="en-US" smtClean="0"/>
               <a:pPr/>
               <a:t>‹#›</a:t>
             </a:fld>
@@ -5082,6 +5167,11 @@
         </p:txBody>
       </p:sp>
     </p:spTree>
+    <p:extLst>
+      <p:ext uri="{BB962C8B-B14F-4D97-AF65-F5344CB8AC3E}">
+        <p14:creationId xmlns:p14="http://schemas.microsoft.com/office/powerpoint/2010/main" val="153351833"/>
+      </p:ext>
+    </p:extLst>
   </p:cSld>
   <p:clrMapOvr>
     <a:masterClrMapping/>
@@ -5557,9 +5647,9 @@
           </a:lstStyle>
           <a:p>
             <a:fld id="{B61BEF0D-F0BB-DE4B-95CE-6DB70DBA9567}" type="datetimeFigureOut">
-              <a:rPr lang="en-US" dirty="0"/>
+              <a:rPr lang="en-US" smtClean="0"/>
               <a:pPr/>
-              <a:t>3/6/17</a:t>
+              <a:t>3/13/17</a:t>
             </a:fld>
             <a:endParaRPr lang="en-US" dirty="0"/>
           </a:p>
@@ -5636,7 +5726,7 @@
           </a:lstStyle>
           <a:p>
             <a:fld id="{D57F1E4F-1CFF-5643-939E-217C01CDF565}" type="slidenum">
-              <a:rPr lang="en-US" dirty="0"/>
+              <a:rPr lang="en-US" smtClean="0"/>
               <a:pPr/>
               <a:t>‹#›</a:t>
             </a:fld>
@@ -5645,26 +5735,31 @@
         </p:txBody>
       </p:sp>
     </p:spTree>
+    <p:extLst>
+      <p:ext uri="{BB962C8B-B14F-4D97-AF65-F5344CB8AC3E}">
+        <p14:creationId xmlns:p14="http://schemas.microsoft.com/office/powerpoint/2010/main" val="271120226"/>
+      </p:ext>
+    </p:extLst>
   </p:cSld>
   <p:clrMap bg1="lt1" tx1="dk1" bg2="lt2" tx2="dk2" accent1="accent1" accent2="accent2" accent3="accent3" accent4="accent4" accent5="accent5" accent6="accent6" hlink="hlink" folHlink="folHlink"/>
   <p:sldLayoutIdLst>
-    <p:sldLayoutId id="2147483649" r:id="rId1"/>
-    <p:sldLayoutId id="2147483650" r:id="rId2"/>
-    <p:sldLayoutId id="2147483651" r:id="rId3"/>
-    <p:sldLayoutId id="2147483652" r:id="rId4"/>
-    <p:sldLayoutId id="2147483653" r:id="rId5"/>
-    <p:sldLayoutId id="2147483654" r:id="rId6"/>
-    <p:sldLayoutId id="2147483655" r:id="rId7"/>
-    <p:sldLayoutId id="2147483656" r:id="rId8"/>
-    <p:sldLayoutId id="2147483660" r:id="rId9"/>
-    <p:sldLayoutId id="2147483657" r:id="rId10"/>
-    <p:sldLayoutId id="2147483663" r:id="rId11"/>
-    <p:sldLayoutId id="2147483664" r:id="rId12"/>
-    <p:sldLayoutId id="2147483665" r:id="rId13"/>
-    <p:sldLayoutId id="2147483666" r:id="rId14"/>
-    <p:sldLayoutId id="2147483667" r:id="rId15"/>
-    <p:sldLayoutId id="2147483658" r:id="rId16"/>
-    <p:sldLayoutId id="2147483659" r:id="rId17"/>
+    <p:sldLayoutId id="2147483693" r:id="rId1"/>
+    <p:sldLayoutId id="2147483694" r:id="rId2"/>
+    <p:sldLayoutId id="2147483695" r:id="rId3"/>
+    <p:sldLayoutId id="2147483696" r:id="rId4"/>
+    <p:sldLayoutId id="2147483697" r:id="rId5"/>
+    <p:sldLayoutId id="2147483698" r:id="rId6"/>
+    <p:sldLayoutId id="2147483699" r:id="rId7"/>
+    <p:sldLayoutId id="2147483700" r:id="rId8"/>
+    <p:sldLayoutId id="2147483701" r:id="rId9"/>
+    <p:sldLayoutId id="2147483702" r:id="rId10"/>
+    <p:sldLayoutId id="2147483703" r:id="rId11"/>
+    <p:sldLayoutId id="2147483704" r:id="rId12"/>
+    <p:sldLayoutId id="2147483705" r:id="rId13"/>
+    <p:sldLayoutId id="2147483706" r:id="rId14"/>
+    <p:sldLayoutId id="2147483707" r:id="rId15"/>
+    <p:sldLayoutId id="2147483708" r:id="rId16"/>
+    <p:sldLayoutId id="2147483709" r:id="rId17"/>
   </p:sldLayoutIdLst>
   <p:txStyles>
     <p:titleStyle>
@@ -6204,7 +6299,6 @@
               <a:rPr lang="en-US" dirty="0"/>
               <a:t>defines a family of algorithms, encapsulates each one, and makes them interchangeable. Strategy lets the algorithm vary independently from clients that use it. </a:t>
             </a:r>
-            <a:endParaRPr lang="en-US" dirty="0"/>
           </a:p>
           <a:p>
             <a:endParaRPr lang="en-US" dirty="0" smtClean="0"/>
@@ -6321,8 +6415,8 @@
         </p:blipFill>
         <p:spPr>
           <a:xfrm>
-            <a:off x="2406999" y="2917520"/>
-            <a:ext cx="8891477" cy="3780793"/>
+            <a:off x="4010331" y="2667000"/>
+            <a:ext cx="4966676" cy="3124200"/>
           </a:xfrm>
           <a:prstGeom prst="rect">
             <a:avLst/>
@@ -6401,7 +6495,6 @@
               <a:rPr lang="en-US" dirty="0"/>
               <a:t>defines a one-to-many dependency between objects so that when one object changes state, all of its dependents are notified and updated automatically. </a:t>
             </a:r>
-            <a:endParaRPr lang="en-US" dirty="0"/>
           </a:p>
           <a:p>
             <a:endParaRPr lang="en-US" dirty="0"/>
@@ -6424,8 +6517,8 @@
         </p:blipFill>
         <p:spPr>
           <a:xfrm>
-            <a:off x="4071916" y="4344966"/>
-            <a:ext cx="3822700" cy="2400300"/>
+            <a:off x="3307827" y="3543300"/>
+            <a:ext cx="5159768" cy="3239854"/>
           </a:xfrm>
           <a:prstGeom prst="rect">
             <a:avLst/>
@@ -6503,8 +6596,8 @@
         </p:blipFill>
         <p:spPr>
           <a:xfrm>
-            <a:off x="1803748" y="2667000"/>
-            <a:ext cx="9519781" cy="4297464"/>
+            <a:off x="4436477" y="2667000"/>
+            <a:ext cx="4114383" cy="3124200"/>
           </a:xfrm>
           <a:prstGeom prst="rect">
             <a:avLst/>
@@ -6560,7 +6653,6 @@
               <a:rPr lang="en-US" dirty="0"/>
               <a:t>Java in-built API for observer pattern</a:t>
             </a:r>
-            <a:endParaRPr lang="en-US" dirty="0"/>
           </a:p>
         </p:txBody>
       </p:sp>

</xml_diff>